<commit_message>
First draft of the final pipeline
First edition of the course, with the polishing of the initial assembly and the final hybrid assembly
</commit_message>
<xml_diff>
--- a/Assembly_and_annotation.pptx
+++ b/Assembly_and_annotation.pptx
@@ -7,7 +7,13 @@
   <p:sldIdLst>
     <p:sldId id="256" r:id="rId2"/>
     <p:sldId id="257" r:id="rId3"/>
-    <p:sldId id="258" r:id="rId4"/>
+    <p:sldId id="259" r:id="rId4"/>
+    <p:sldId id="264" r:id="rId5"/>
+    <p:sldId id="260" r:id="rId6"/>
+    <p:sldId id="258" r:id="rId7"/>
+    <p:sldId id="261" r:id="rId8"/>
+    <p:sldId id="262" r:id="rId9"/>
+    <p:sldId id="263" r:id="rId10"/>
   </p:sldIdLst>
   <p:sldSz cx="12192000" cy="6858000"/>
   <p:notesSz cx="6858000" cy="9144000"/>
@@ -106,6 +112,11 @@
       </a:defRPr>
     </a:lvl9pPr>
   </p:defaultTextStyle>
+  <p:extLst>
+    <p:ext uri="{EFAFB233-063F-42B5-8137-9DF3F51BA10A}">
+      <p15:sldGuideLst xmlns:p15="http://schemas.microsoft.com/office/powerpoint/2012/main"/>
+    </p:ext>
+  </p:extLst>
 </p:presentation>
 </file>
 
@@ -258,7 +269,7 @@
           <a:p>
             <a:fld id="{D84CC677-12A4-480E-ADAB-1F17E65856DF}" type="datetimeFigureOut">
               <a:rPr lang="en-GB" smtClean="0"/>
-              <a:t>29/07/2024</a:t>
+              <a:t>18/08/2024</a:t>
             </a:fld>
             <a:endParaRPr lang="en-GB"/>
           </a:p>
@@ -458,7 +469,7 @@
           <a:p>
             <a:fld id="{D84CC677-12A4-480E-ADAB-1F17E65856DF}" type="datetimeFigureOut">
               <a:rPr lang="en-GB" smtClean="0"/>
-              <a:t>29/07/2024</a:t>
+              <a:t>18/08/2024</a:t>
             </a:fld>
             <a:endParaRPr lang="en-GB"/>
           </a:p>
@@ -668,7 +679,7 @@
           <a:p>
             <a:fld id="{D84CC677-12A4-480E-ADAB-1F17E65856DF}" type="datetimeFigureOut">
               <a:rPr lang="en-GB" smtClean="0"/>
-              <a:t>29/07/2024</a:t>
+              <a:t>18/08/2024</a:t>
             </a:fld>
             <a:endParaRPr lang="en-GB"/>
           </a:p>
@@ -868,7 +879,7 @@
           <a:p>
             <a:fld id="{D84CC677-12A4-480E-ADAB-1F17E65856DF}" type="datetimeFigureOut">
               <a:rPr lang="en-GB" smtClean="0"/>
-              <a:t>29/07/2024</a:t>
+              <a:t>18/08/2024</a:t>
             </a:fld>
             <a:endParaRPr lang="en-GB"/>
           </a:p>
@@ -1144,7 +1155,7 @@
           <a:p>
             <a:fld id="{D84CC677-12A4-480E-ADAB-1F17E65856DF}" type="datetimeFigureOut">
               <a:rPr lang="en-GB" smtClean="0"/>
-              <a:t>29/07/2024</a:t>
+              <a:t>18/08/2024</a:t>
             </a:fld>
             <a:endParaRPr lang="en-GB"/>
           </a:p>
@@ -1412,7 +1423,7 @@
           <a:p>
             <a:fld id="{D84CC677-12A4-480E-ADAB-1F17E65856DF}" type="datetimeFigureOut">
               <a:rPr lang="en-GB" smtClean="0"/>
-              <a:t>29/07/2024</a:t>
+              <a:t>18/08/2024</a:t>
             </a:fld>
             <a:endParaRPr lang="en-GB"/>
           </a:p>
@@ -1827,7 +1838,7 @@
           <a:p>
             <a:fld id="{D84CC677-12A4-480E-ADAB-1F17E65856DF}" type="datetimeFigureOut">
               <a:rPr lang="en-GB" smtClean="0"/>
-              <a:t>29/07/2024</a:t>
+              <a:t>18/08/2024</a:t>
             </a:fld>
             <a:endParaRPr lang="en-GB"/>
           </a:p>
@@ -1969,7 +1980,7 @@
           <a:p>
             <a:fld id="{D84CC677-12A4-480E-ADAB-1F17E65856DF}" type="datetimeFigureOut">
               <a:rPr lang="en-GB" smtClean="0"/>
-              <a:t>29/07/2024</a:t>
+              <a:t>18/08/2024</a:t>
             </a:fld>
             <a:endParaRPr lang="en-GB"/>
           </a:p>
@@ -2082,7 +2093,7 @@
           <a:p>
             <a:fld id="{D84CC677-12A4-480E-ADAB-1F17E65856DF}" type="datetimeFigureOut">
               <a:rPr lang="en-GB" smtClean="0"/>
-              <a:t>29/07/2024</a:t>
+              <a:t>18/08/2024</a:t>
             </a:fld>
             <a:endParaRPr lang="en-GB"/>
           </a:p>
@@ -2395,7 +2406,7 @@
           <a:p>
             <a:fld id="{D84CC677-12A4-480E-ADAB-1F17E65856DF}" type="datetimeFigureOut">
               <a:rPr lang="en-GB" smtClean="0"/>
-              <a:t>29/07/2024</a:t>
+              <a:t>18/08/2024</a:t>
             </a:fld>
             <a:endParaRPr lang="en-GB"/>
           </a:p>
@@ -2684,7 +2695,7 @@
           <a:p>
             <a:fld id="{D84CC677-12A4-480E-ADAB-1F17E65856DF}" type="datetimeFigureOut">
               <a:rPr lang="en-GB" smtClean="0"/>
-              <a:t>29/07/2024</a:t>
+              <a:t>18/08/2024</a:t>
             </a:fld>
             <a:endParaRPr lang="en-GB"/>
           </a:p>
@@ -2927,7 +2938,7 @@
           <a:p>
             <a:fld id="{D84CC677-12A4-480E-ADAB-1F17E65856DF}" type="datetimeFigureOut">
               <a:rPr lang="en-GB" smtClean="0"/>
-              <a:t>29/07/2024</a:t>
+              <a:t>18/08/2024</a:t>
             </a:fld>
             <a:endParaRPr lang="en-GB"/>
           </a:p>
@@ -3589,6 +3600,17 @@
             </a:pPr>
             <a:r>
               <a:rPr lang="es-ES" dirty="0" err="1"/>
+              <a:t>Polishing</a:t>
+            </a:r>
+            <a:endParaRPr lang="es-ES" dirty="0"/>
+          </a:p>
+          <a:p>
+            <a:pPr marL="971550" lvl="1" indent="-514350">
+              <a:buFont typeface="+mj-lt"/>
+              <a:buAutoNum type="arabicPeriod"/>
+            </a:pPr>
+            <a:r>
+              <a:rPr lang="es-ES" dirty="0" err="1"/>
               <a:t>Circularization</a:t>
             </a:r>
             <a:r>
@@ -3698,6 +3720,795 @@
           <p:cNvPr id="2" name="Title 1">
             <a:extLst>
               <a:ext uri="{FF2B5EF4-FFF2-40B4-BE49-F238E27FC236}">
+                <a16:creationId xmlns:a16="http://schemas.microsoft.com/office/drawing/2014/main" id="{D4EF74B4-DB17-2B31-AF16-6CCA32F99F65}"/>
+              </a:ext>
+            </a:extLst>
+          </p:cNvPr>
+          <p:cNvSpPr>
+            <a:spLocks noGrp="1"/>
+          </p:cNvSpPr>
+          <p:nvPr>
+            <p:ph type="title"/>
+          </p:nvPr>
+        </p:nvSpPr>
+        <p:spPr/>
+        <p:txBody>
+          <a:bodyPr/>
+          <a:lstStyle/>
+          <a:p>
+            <a:r>
+              <a:rPr lang="es-ES" dirty="0" err="1"/>
+              <a:t>Assembly</a:t>
+            </a:r>
+            <a:r>
+              <a:rPr lang="es-ES" dirty="0"/>
+              <a:t> basis</a:t>
+            </a:r>
+            <a:endParaRPr lang="en-GB" dirty="0"/>
+          </a:p>
+        </p:txBody>
+      </p:sp>
+      <p:sp>
+        <p:nvSpPr>
+          <p:cNvPr id="3" name="Content Placeholder 2">
+            <a:extLst>
+              <a:ext uri="{FF2B5EF4-FFF2-40B4-BE49-F238E27FC236}">
+                <a16:creationId xmlns:a16="http://schemas.microsoft.com/office/drawing/2014/main" id="{7392F7EA-461E-B534-59D8-BAC8F9CE77FA}"/>
+              </a:ext>
+            </a:extLst>
+          </p:cNvPr>
+          <p:cNvSpPr>
+            <a:spLocks noGrp="1"/>
+          </p:cNvSpPr>
+          <p:nvPr>
+            <p:ph idx="1"/>
+          </p:nvPr>
+        </p:nvSpPr>
+        <p:spPr/>
+        <p:txBody>
+          <a:bodyPr/>
+          <a:lstStyle/>
+          <a:p>
+            <a:r>
+              <a:rPr lang="es-ES" dirty="0" err="1"/>
+              <a:t>Process</a:t>
+            </a:r>
+            <a:r>
+              <a:rPr lang="es-ES" dirty="0"/>
+              <a:t> </a:t>
+            </a:r>
+            <a:r>
+              <a:rPr lang="es-ES" dirty="0" err="1"/>
+              <a:t>that</a:t>
+            </a:r>
+            <a:r>
+              <a:rPr lang="es-ES" dirty="0"/>
+              <a:t> </a:t>
+            </a:r>
+            <a:r>
+              <a:rPr lang="es-ES" dirty="0" err="1"/>
+              <a:t>reconstructs</a:t>
+            </a:r>
+            <a:r>
+              <a:rPr lang="es-ES" dirty="0"/>
+              <a:t> a </a:t>
+            </a:r>
+            <a:r>
+              <a:rPr lang="es-ES" dirty="0" err="1"/>
+              <a:t>whole</a:t>
+            </a:r>
+            <a:r>
+              <a:rPr lang="es-ES" dirty="0"/>
+              <a:t> </a:t>
+            </a:r>
+            <a:r>
+              <a:rPr lang="es-ES" dirty="0" err="1"/>
+              <a:t>genome</a:t>
+            </a:r>
+            <a:r>
+              <a:rPr lang="es-ES" dirty="0"/>
+              <a:t> </a:t>
+            </a:r>
+            <a:r>
+              <a:rPr lang="es-ES" dirty="0" err="1"/>
+              <a:t>sequences</a:t>
+            </a:r>
+            <a:r>
+              <a:rPr lang="es-ES" dirty="0"/>
+              <a:t> </a:t>
+            </a:r>
+            <a:r>
+              <a:rPr lang="es-ES" dirty="0" err="1"/>
+              <a:t>from</a:t>
+            </a:r>
+            <a:r>
+              <a:rPr lang="es-ES" dirty="0"/>
+              <a:t> a set </a:t>
+            </a:r>
+            <a:r>
+              <a:rPr lang="es-ES" dirty="0" err="1"/>
+              <a:t>of</a:t>
+            </a:r>
+            <a:r>
+              <a:rPr lang="es-ES" dirty="0"/>
+              <a:t> </a:t>
+            </a:r>
+            <a:r>
+              <a:rPr lang="es-ES" dirty="0" err="1"/>
+              <a:t>reads</a:t>
+            </a:r>
+            <a:r>
+              <a:rPr lang="es-ES" dirty="0"/>
+              <a:t>. </a:t>
+            </a:r>
+            <a:r>
+              <a:rPr lang="es-ES" dirty="0" err="1"/>
+              <a:t>It</a:t>
+            </a:r>
+            <a:r>
+              <a:rPr lang="es-ES" dirty="0"/>
+              <a:t> </a:t>
+            </a:r>
+            <a:r>
+              <a:rPr lang="es-ES" dirty="0" err="1"/>
+              <a:t>works</a:t>
+            </a:r>
+            <a:r>
+              <a:rPr lang="es-ES" dirty="0"/>
+              <a:t> </a:t>
+            </a:r>
+            <a:r>
+              <a:rPr lang="es-ES" dirty="0" err="1"/>
+              <a:t>by</a:t>
+            </a:r>
+            <a:r>
+              <a:rPr lang="es-ES" dirty="0"/>
+              <a:t> </a:t>
+            </a:r>
+            <a:r>
+              <a:rPr lang="es-ES" dirty="0" err="1"/>
+              <a:t>aligning</a:t>
+            </a:r>
+            <a:r>
+              <a:rPr lang="es-ES" dirty="0"/>
+              <a:t> and </a:t>
+            </a:r>
+            <a:r>
+              <a:rPr lang="es-ES" dirty="0" err="1"/>
+              <a:t>merging</a:t>
+            </a:r>
+            <a:r>
+              <a:rPr lang="es-ES" dirty="0"/>
+              <a:t> </a:t>
+            </a:r>
+            <a:r>
+              <a:rPr lang="es-ES" dirty="0" err="1"/>
+              <a:t>the</a:t>
+            </a:r>
+            <a:r>
+              <a:rPr lang="es-ES" dirty="0"/>
+              <a:t> raw </a:t>
+            </a:r>
+            <a:r>
+              <a:rPr lang="es-ES" dirty="0" err="1"/>
+              <a:t>sequencing</a:t>
+            </a:r>
+            <a:r>
+              <a:rPr lang="es-ES" dirty="0"/>
+              <a:t> </a:t>
+            </a:r>
+            <a:r>
+              <a:rPr lang="es-ES" dirty="0" err="1"/>
+              <a:t>reads</a:t>
+            </a:r>
+            <a:r>
+              <a:rPr lang="es-ES" dirty="0"/>
+              <a:t>. </a:t>
+            </a:r>
+          </a:p>
+          <a:p>
+            <a:r>
+              <a:rPr lang="es-ES" dirty="0" err="1"/>
+              <a:t>Mainly</a:t>
+            </a:r>
+            <a:r>
+              <a:rPr lang="es-ES" dirty="0"/>
+              <a:t> done </a:t>
+            </a:r>
+            <a:r>
+              <a:rPr lang="es-ES" dirty="0" err="1"/>
+              <a:t>by</a:t>
+            </a:r>
+            <a:r>
+              <a:rPr lang="es-ES" dirty="0"/>
+              <a:t> </a:t>
+            </a:r>
+            <a:r>
+              <a:rPr lang="es-ES" dirty="0" err="1"/>
+              <a:t>graph-based</a:t>
+            </a:r>
+            <a:r>
+              <a:rPr lang="es-ES" dirty="0"/>
+              <a:t> </a:t>
+            </a:r>
+            <a:r>
+              <a:rPr lang="es-ES" dirty="0" err="1"/>
+              <a:t>apporaches</a:t>
+            </a:r>
+            <a:r>
+              <a:rPr lang="es-ES" dirty="0"/>
+              <a:t>:</a:t>
+            </a:r>
+          </a:p>
+          <a:p>
+            <a:pPr lvl="1"/>
+            <a:r>
+              <a:rPr lang="es-ES" dirty="0" err="1"/>
+              <a:t>DeBrujinn</a:t>
+            </a:r>
+            <a:r>
+              <a:rPr lang="es-ES" dirty="0"/>
+              <a:t> </a:t>
+            </a:r>
+            <a:r>
+              <a:rPr lang="es-ES" dirty="0" err="1"/>
+              <a:t>graphs</a:t>
+            </a:r>
+            <a:r>
+              <a:rPr lang="es-ES" dirty="0"/>
+              <a:t> </a:t>
+            </a:r>
+            <a:r>
+              <a:rPr lang="es-ES" dirty="0">
+                <a:sym typeface="Wingdings" panose="05000000000000000000" pitchFamily="2" charset="2"/>
+              </a:rPr>
+              <a:t> </a:t>
+            </a:r>
+            <a:r>
+              <a:rPr lang="es-ES" dirty="0" err="1">
+                <a:sym typeface="Wingdings" panose="05000000000000000000" pitchFamily="2" charset="2"/>
+              </a:rPr>
+              <a:t>Exact</a:t>
+            </a:r>
+            <a:r>
+              <a:rPr lang="es-ES" dirty="0">
+                <a:sym typeface="Wingdings" panose="05000000000000000000" pitchFamily="2" charset="2"/>
+              </a:rPr>
+              <a:t> </a:t>
+            </a:r>
+            <a:r>
+              <a:rPr lang="es-ES" dirty="0" err="1">
+                <a:sym typeface="Wingdings" panose="05000000000000000000" pitchFamily="2" charset="2"/>
+              </a:rPr>
+              <a:t>matches</a:t>
+            </a:r>
+            <a:r>
+              <a:rPr lang="es-ES" dirty="0">
+                <a:sym typeface="Wingdings" panose="05000000000000000000" pitchFamily="2" charset="2"/>
+              </a:rPr>
+              <a:t> </a:t>
+            </a:r>
+            <a:r>
+              <a:rPr lang="es-ES" dirty="0" err="1">
+                <a:sym typeface="Wingdings" panose="05000000000000000000" pitchFamily="2" charset="2"/>
+              </a:rPr>
+              <a:t>of</a:t>
+            </a:r>
+            <a:r>
+              <a:rPr lang="es-ES" dirty="0">
+                <a:sym typeface="Wingdings" panose="05000000000000000000" pitchFamily="2" charset="2"/>
+              </a:rPr>
+              <a:t> k-</a:t>
+            </a:r>
+            <a:r>
+              <a:rPr lang="es-ES" dirty="0" err="1">
+                <a:sym typeface="Wingdings" panose="05000000000000000000" pitchFamily="2" charset="2"/>
+              </a:rPr>
+              <a:t>mers</a:t>
+            </a:r>
+            <a:endParaRPr lang="es-ES" dirty="0">
+              <a:sym typeface="Wingdings" panose="05000000000000000000" pitchFamily="2" charset="2"/>
+            </a:endParaRPr>
+          </a:p>
+          <a:p>
+            <a:pPr lvl="1"/>
+            <a:r>
+              <a:rPr lang="es-ES" dirty="0" err="1">
+                <a:sym typeface="Wingdings" panose="05000000000000000000" pitchFamily="2" charset="2"/>
+              </a:rPr>
+              <a:t>Repeat</a:t>
+            </a:r>
+            <a:r>
+              <a:rPr lang="es-ES" dirty="0">
+                <a:sym typeface="Wingdings" panose="05000000000000000000" pitchFamily="2" charset="2"/>
+              </a:rPr>
+              <a:t> </a:t>
+            </a:r>
+            <a:r>
+              <a:rPr lang="es-ES" dirty="0" err="1">
+                <a:sym typeface="Wingdings" panose="05000000000000000000" pitchFamily="2" charset="2"/>
+              </a:rPr>
+              <a:t>graphs</a:t>
+            </a:r>
+            <a:r>
+              <a:rPr lang="es-ES" dirty="0">
+                <a:sym typeface="Wingdings" panose="05000000000000000000" pitchFamily="2" charset="2"/>
+              </a:rPr>
+              <a:t>  </a:t>
+            </a:r>
+            <a:r>
+              <a:rPr lang="es-ES" dirty="0" err="1">
+                <a:sym typeface="Wingdings" panose="05000000000000000000" pitchFamily="2" charset="2"/>
+              </a:rPr>
+              <a:t>Approximate</a:t>
+            </a:r>
+            <a:r>
+              <a:rPr lang="es-ES" dirty="0">
+                <a:sym typeface="Wingdings" panose="05000000000000000000" pitchFamily="2" charset="2"/>
+              </a:rPr>
+              <a:t> </a:t>
+            </a:r>
+            <a:r>
+              <a:rPr lang="es-ES" dirty="0" err="1">
+                <a:sym typeface="Wingdings" panose="05000000000000000000" pitchFamily="2" charset="2"/>
+              </a:rPr>
+              <a:t>sequence</a:t>
+            </a:r>
+            <a:r>
+              <a:rPr lang="es-ES" dirty="0">
+                <a:sym typeface="Wingdings" panose="05000000000000000000" pitchFamily="2" charset="2"/>
+              </a:rPr>
+              <a:t> </a:t>
+            </a:r>
+            <a:r>
+              <a:rPr lang="es-ES" dirty="0" err="1">
+                <a:sym typeface="Wingdings" panose="05000000000000000000" pitchFamily="2" charset="2"/>
+              </a:rPr>
+              <a:t>matches</a:t>
+            </a:r>
+            <a:endParaRPr lang="es-ES" dirty="0">
+              <a:sym typeface="Wingdings" panose="05000000000000000000" pitchFamily="2" charset="2"/>
+            </a:endParaRPr>
+          </a:p>
+          <a:p>
+            <a:r>
+              <a:rPr lang="es-ES" dirty="0" err="1">
+                <a:sym typeface="Wingdings" panose="05000000000000000000" pitchFamily="2" charset="2"/>
+              </a:rPr>
+              <a:t>The</a:t>
+            </a:r>
+            <a:r>
+              <a:rPr lang="es-ES" dirty="0">
+                <a:sym typeface="Wingdings" panose="05000000000000000000" pitchFamily="2" charset="2"/>
+              </a:rPr>
+              <a:t> </a:t>
+            </a:r>
+            <a:r>
+              <a:rPr lang="es-ES" dirty="0" err="1">
+                <a:sym typeface="Wingdings" panose="05000000000000000000" pitchFamily="2" charset="2"/>
+              </a:rPr>
+              <a:t>graphs</a:t>
+            </a:r>
+            <a:r>
+              <a:rPr lang="es-ES" dirty="0">
+                <a:sym typeface="Wingdings" panose="05000000000000000000" pitchFamily="2" charset="2"/>
+              </a:rPr>
+              <a:t> can be </a:t>
+            </a:r>
+            <a:r>
+              <a:rPr lang="es-ES" dirty="0" err="1">
+                <a:sym typeface="Wingdings" panose="05000000000000000000" pitchFamily="2" charset="2"/>
+              </a:rPr>
+              <a:t>visualized</a:t>
+            </a:r>
+            <a:r>
+              <a:rPr lang="es-ES" dirty="0">
+                <a:sym typeface="Wingdings" panose="05000000000000000000" pitchFamily="2" charset="2"/>
+              </a:rPr>
+              <a:t> </a:t>
+            </a:r>
+            <a:r>
+              <a:rPr lang="es-ES" dirty="0" err="1">
+                <a:sym typeface="Wingdings" panose="05000000000000000000" pitchFamily="2" charset="2"/>
+              </a:rPr>
+              <a:t>to</a:t>
+            </a:r>
+            <a:r>
+              <a:rPr lang="es-ES" dirty="0">
+                <a:sym typeface="Wingdings" panose="05000000000000000000" pitchFamily="2" charset="2"/>
+              </a:rPr>
+              <a:t> </a:t>
+            </a:r>
+            <a:r>
+              <a:rPr lang="es-ES" dirty="0" err="1">
+                <a:sym typeface="Wingdings" panose="05000000000000000000" pitchFamily="2" charset="2"/>
+              </a:rPr>
+              <a:t>assess</a:t>
+            </a:r>
+            <a:r>
+              <a:rPr lang="es-ES" dirty="0">
+                <a:sym typeface="Wingdings" panose="05000000000000000000" pitchFamily="2" charset="2"/>
+              </a:rPr>
+              <a:t> </a:t>
+            </a:r>
+            <a:r>
+              <a:rPr lang="es-ES" dirty="0" err="1">
+                <a:sym typeface="Wingdings" panose="05000000000000000000" pitchFamily="2" charset="2"/>
+              </a:rPr>
+              <a:t>how</a:t>
+            </a:r>
+            <a:r>
+              <a:rPr lang="es-ES" dirty="0">
+                <a:sym typeface="Wingdings" panose="05000000000000000000" pitchFamily="2" charset="2"/>
+              </a:rPr>
+              <a:t> </a:t>
+            </a:r>
+            <a:r>
+              <a:rPr lang="es-ES" dirty="0" err="1">
+                <a:sym typeface="Wingdings" panose="05000000000000000000" pitchFamily="2" charset="2"/>
+              </a:rPr>
+              <a:t>good</a:t>
+            </a:r>
+            <a:r>
+              <a:rPr lang="es-ES" dirty="0">
+                <a:sym typeface="Wingdings" panose="05000000000000000000" pitchFamily="2" charset="2"/>
+              </a:rPr>
+              <a:t> </a:t>
+            </a:r>
+            <a:r>
+              <a:rPr lang="es-ES" dirty="0" err="1">
+                <a:sym typeface="Wingdings" panose="05000000000000000000" pitchFamily="2" charset="2"/>
+              </a:rPr>
+              <a:t>the</a:t>
+            </a:r>
+            <a:r>
+              <a:rPr lang="es-ES" dirty="0">
+                <a:sym typeface="Wingdings" panose="05000000000000000000" pitchFamily="2" charset="2"/>
+              </a:rPr>
+              <a:t> </a:t>
+            </a:r>
+            <a:r>
+              <a:rPr lang="es-ES" dirty="0" err="1">
+                <a:sym typeface="Wingdings" panose="05000000000000000000" pitchFamily="2" charset="2"/>
+              </a:rPr>
+              <a:t>assembly</a:t>
+            </a:r>
+            <a:r>
+              <a:rPr lang="es-ES" dirty="0">
+                <a:sym typeface="Wingdings" panose="05000000000000000000" pitchFamily="2" charset="2"/>
+              </a:rPr>
+              <a:t> </a:t>
+            </a:r>
+            <a:r>
+              <a:rPr lang="es-ES" dirty="0" err="1">
+                <a:sym typeface="Wingdings" panose="05000000000000000000" pitchFamily="2" charset="2"/>
+              </a:rPr>
+              <a:t>is</a:t>
+            </a:r>
+            <a:endParaRPr lang="en-GB" dirty="0"/>
+          </a:p>
+        </p:txBody>
+      </p:sp>
+    </p:spTree>
+    <p:extLst>
+      <p:ext uri="{BB962C8B-B14F-4D97-AF65-F5344CB8AC3E}">
+        <p14:creationId xmlns:p14="http://schemas.microsoft.com/office/powerpoint/2010/main" val="353042472"/>
+      </p:ext>
+    </p:extLst>
+  </p:cSld>
+  <p:clrMapOvr>
+    <a:masterClrMapping/>
+  </p:clrMapOvr>
+</p:sld>
+</file>
+
+<file path=ppt/slides/slide4.xml><?xml version="1.0" encoding="utf-8"?>
+<p:sld xmlns:a="http://schemas.openxmlformats.org/drawingml/2006/main" xmlns:r="http://schemas.openxmlformats.org/officeDocument/2006/relationships" xmlns:p="http://schemas.openxmlformats.org/presentationml/2006/main">
+  <p:cSld>
+    <p:spTree>
+      <p:nvGrpSpPr>
+        <p:cNvPr id="1" name=""/>
+        <p:cNvGrpSpPr/>
+        <p:nvPr/>
+      </p:nvGrpSpPr>
+      <p:grpSpPr>
+        <a:xfrm>
+          <a:off x="0" y="0"/>
+          <a:ext cx="0" cy="0"/>
+          <a:chOff x="0" y="0"/>
+          <a:chExt cx="0" cy="0"/>
+        </a:xfrm>
+      </p:grpSpPr>
+      <p:sp>
+        <p:nvSpPr>
+          <p:cNvPr id="2" name="Title 1">
+            <a:extLst>
+              <a:ext uri="{FF2B5EF4-FFF2-40B4-BE49-F238E27FC236}">
+                <a16:creationId xmlns:a16="http://schemas.microsoft.com/office/drawing/2014/main" id="{DC86157D-FD74-7065-87B8-DF4A182EA228}"/>
+              </a:ext>
+            </a:extLst>
+          </p:cNvPr>
+          <p:cNvSpPr>
+            <a:spLocks noGrp="1"/>
+          </p:cNvSpPr>
+          <p:nvPr>
+            <p:ph type="title"/>
+          </p:nvPr>
+        </p:nvSpPr>
+        <p:spPr/>
+        <p:txBody>
+          <a:bodyPr/>
+          <a:lstStyle/>
+          <a:p>
+            <a:r>
+              <a:rPr lang="es-ES" dirty="0" err="1"/>
+              <a:t>Preparation</a:t>
+            </a:r>
+            <a:endParaRPr lang="en-GB" dirty="0"/>
+          </a:p>
+        </p:txBody>
+      </p:sp>
+      <p:sp>
+        <p:nvSpPr>
+          <p:cNvPr id="3" name="Content Placeholder 2">
+            <a:extLst>
+              <a:ext uri="{FF2B5EF4-FFF2-40B4-BE49-F238E27FC236}">
+                <a16:creationId xmlns:a16="http://schemas.microsoft.com/office/drawing/2014/main" id="{45C5A804-C3D5-6A20-051D-7A6D351A8B2A}"/>
+              </a:ext>
+            </a:extLst>
+          </p:cNvPr>
+          <p:cNvSpPr>
+            <a:spLocks noGrp="1"/>
+          </p:cNvSpPr>
+          <p:nvPr>
+            <p:ph idx="1"/>
+          </p:nvPr>
+        </p:nvSpPr>
+        <p:spPr/>
+        <p:txBody>
+          <a:bodyPr/>
+          <a:lstStyle/>
+          <a:p>
+            <a:r>
+              <a:rPr lang="es-ES" dirty="0" err="1"/>
+              <a:t>Assesing</a:t>
+            </a:r>
+            <a:r>
+              <a:rPr lang="es-ES" dirty="0"/>
+              <a:t> </a:t>
+            </a:r>
+            <a:r>
+              <a:rPr lang="es-ES" dirty="0" err="1"/>
+              <a:t>intial</a:t>
+            </a:r>
+            <a:r>
+              <a:rPr lang="es-ES" dirty="0"/>
+              <a:t> </a:t>
+            </a:r>
+            <a:r>
+              <a:rPr lang="es-ES" dirty="0" err="1"/>
+              <a:t>read</a:t>
+            </a:r>
+            <a:r>
+              <a:rPr lang="es-ES" dirty="0"/>
+              <a:t> </a:t>
+            </a:r>
+            <a:r>
+              <a:rPr lang="es-ES" dirty="0" err="1"/>
+              <a:t>quality</a:t>
+            </a:r>
+            <a:endParaRPr lang="en-GB" dirty="0"/>
+          </a:p>
+          <a:p>
+            <a:pPr lvl="1"/>
+            <a:r>
+              <a:rPr lang="en-GB" dirty="0"/>
+              <a:t>Quality (</a:t>
+            </a:r>
+            <a:r>
+              <a:rPr lang="en-GB" dirty="0" err="1"/>
+              <a:t>phred</a:t>
+            </a:r>
+            <a:r>
+              <a:rPr lang="en-GB" dirty="0"/>
+              <a:t> score)</a:t>
+            </a:r>
+            <a:r>
+              <a:rPr lang="en-GB" dirty="0">
+                <a:sym typeface="Wingdings" panose="05000000000000000000" pitchFamily="2" charset="2"/>
+              </a:rPr>
+              <a:t> Estimate of the sequencing error</a:t>
+            </a:r>
+          </a:p>
+          <a:p>
+            <a:pPr lvl="1"/>
+            <a:r>
+              <a:rPr lang="en-GB" dirty="0">
+                <a:sym typeface="Wingdings" panose="05000000000000000000" pitchFamily="2" charset="2"/>
+              </a:rPr>
+              <a:t>Length </a:t>
+            </a:r>
+          </a:p>
+          <a:p>
+            <a:pPr lvl="1"/>
+            <a:r>
+              <a:rPr lang="en-GB" dirty="0">
+                <a:sym typeface="Wingdings" panose="05000000000000000000" pitchFamily="2" charset="2"/>
+              </a:rPr>
+              <a:t>Number of reads</a:t>
+            </a:r>
+            <a:endParaRPr lang="es-ES" dirty="0"/>
+          </a:p>
+        </p:txBody>
+      </p:sp>
+      <p:pic>
+        <p:nvPicPr>
+          <p:cNvPr id="5" name="Picture 4" descr="A chart with green and white dots&#10;&#10;Description automatically generated with medium confidence">
+            <a:extLst>
+              <a:ext uri="{FF2B5EF4-FFF2-40B4-BE49-F238E27FC236}">
+                <a16:creationId xmlns:a16="http://schemas.microsoft.com/office/drawing/2014/main" id="{023C291C-236C-2D3C-FFF8-4D70416C15D3}"/>
+              </a:ext>
+            </a:extLst>
+          </p:cNvPr>
+          <p:cNvPicPr>
+            <a:picLocks noChangeAspect="1"/>
+          </p:cNvPicPr>
+          <p:nvPr/>
+        </p:nvPicPr>
+        <p:blipFill>
+          <a:blip r:embed="rId2">
+            <a:extLst>
+              <a:ext uri="{28A0092B-C50C-407E-A947-70E740481C1C}">
+                <a14:useLocalDpi xmlns:a14="http://schemas.microsoft.com/office/drawing/2010/main" val="0"/>
+              </a:ext>
+            </a:extLst>
+          </a:blip>
+          <a:stretch>
+            <a:fillRect/>
+          </a:stretch>
+        </p:blipFill>
+        <p:spPr>
+          <a:xfrm>
+            <a:off x="8213724" y="2905124"/>
+            <a:ext cx="3692525" cy="3692525"/>
+          </a:xfrm>
+          <a:prstGeom prst="rect">
+            <a:avLst/>
+          </a:prstGeom>
+        </p:spPr>
+      </p:pic>
+      <p:pic>
+        <p:nvPicPr>
+          <p:cNvPr id="7" name="Picture 6">
+            <a:extLst>
+              <a:ext uri="{FF2B5EF4-FFF2-40B4-BE49-F238E27FC236}">
+                <a16:creationId xmlns:a16="http://schemas.microsoft.com/office/drawing/2014/main" id="{30667EF4-DD48-0CF9-E85E-DEEC783010E2}"/>
+              </a:ext>
+            </a:extLst>
+          </p:cNvPr>
+          <p:cNvPicPr>
+            <a:picLocks noChangeAspect="1"/>
+          </p:cNvPicPr>
+          <p:nvPr/>
+        </p:nvPicPr>
+        <p:blipFill>
+          <a:blip r:embed="rId3"/>
+          <a:stretch>
+            <a:fillRect/>
+          </a:stretch>
+        </p:blipFill>
+        <p:spPr>
+          <a:xfrm>
+            <a:off x="1625195" y="3949345"/>
+            <a:ext cx="5801535" cy="2543530"/>
+          </a:xfrm>
+          <a:prstGeom prst="rect">
+            <a:avLst/>
+          </a:prstGeom>
+        </p:spPr>
+      </p:pic>
+    </p:spTree>
+    <p:extLst>
+      <p:ext uri="{BB962C8B-B14F-4D97-AF65-F5344CB8AC3E}">
+        <p14:creationId xmlns:p14="http://schemas.microsoft.com/office/powerpoint/2010/main" val="2462672950"/>
+      </p:ext>
+    </p:extLst>
+  </p:cSld>
+  <p:clrMapOvr>
+    <a:masterClrMapping/>
+  </p:clrMapOvr>
+</p:sld>
+</file>
+
+<file path=ppt/slides/slide5.xml><?xml version="1.0" encoding="utf-8"?>
+<p:sld xmlns:a="http://schemas.openxmlformats.org/drawingml/2006/main" xmlns:r="http://schemas.openxmlformats.org/officeDocument/2006/relationships" xmlns:p="http://schemas.openxmlformats.org/presentationml/2006/main">
+  <p:cSld>
+    <p:spTree>
+      <p:nvGrpSpPr>
+        <p:cNvPr id="1" name=""/>
+        <p:cNvGrpSpPr/>
+        <p:nvPr/>
+      </p:nvGrpSpPr>
+      <p:grpSpPr>
+        <a:xfrm>
+          <a:off x="0" y="0"/>
+          <a:ext cx="0" cy="0"/>
+          <a:chOff x="0" y="0"/>
+          <a:chExt cx="0" cy="0"/>
+        </a:xfrm>
+      </p:grpSpPr>
+      <p:sp>
+        <p:nvSpPr>
+          <p:cNvPr id="2" name="Title 1">
+            <a:extLst>
+              <a:ext uri="{FF2B5EF4-FFF2-40B4-BE49-F238E27FC236}">
+                <a16:creationId xmlns:a16="http://schemas.microsoft.com/office/drawing/2014/main" id="{22C4C2A2-7271-5BFB-FAC4-2BDC130771E3}"/>
+              </a:ext>
+            </a:extLst>
+          </p:cNvPr>
+          <p:cNvSpPr>
+            <a:spLocks noGrp="1"/>
+          </p:cNvSpPr>
+          <p:nvPr>
+            <p:ph type="title"/>
+          </p:nvPr>
+        </p:nvSpPr>
+        <p:spPr/>
+        <p:txBody>
+          <a:bodyPr/>
+          <a:lstStyle/>
+          <a:p>
+            <a:r>
+              <a:rPr lang="es-ES" dirty="0" err="1"/>
+              <a:t>Graph</a:t>
+            </a:r>
+            <a:r>
+              <a:rPr lang="es-ES" dirty="0"/>
+              <a:t> </a:t>
+            </a:r>
+            <a:r>
+              <a:rPr lang="es-ES" dirty="0" err="1"/>
+              <a:t>example</a:t>
+            </a:r>
+            <a:endParaRPr lang="en-GB" dirty="0"/>
+          </a:p>
+        </p:txBody>
+      </p:sp>
+    </p:spTree>
+    <p:extLst>
+      <p:ext uri="{BB962C8B-B14F-4D97-AF65-F5344CB8AC3E}">
+        <p14:creationId xmlns:p14="http://schemas.microsoft.com/office/powerpoint/2010/main" val="3307718384"/>
+      </p:ext>
+    </p:extLst>
+  </p:cSld>
+  <p:clrMapOvr>
+    <a:masterClrMapping/>
+  </p:clrMapOvr>
+</p:sld>
+</file>
+
+<file path=ppt/slides/slide6.xml><?xml version="1.0" encoding="utf-8"?>
+<p:sld xmlns:a="http://schemas.openxmlformats.org/drawingml/2006/main" xmlns:r="http://schemas.openxmlformats.org/officeDocument/2006/relationships" xmlns:p="http://schemas.openxmlformats.org/presentationml/2006/main">
+  <p:cSld>
+    <p:spTree>
+      <p:nvGrpSpPr>
+        <p:cNvPr id="1" name=""/>
+        <p:cNvGrpSpPr/>
+        <p:nvPr/>
+      </p:nvGrpSpPr>
+      <p:grpSpPr>
+        <a:xfrm>
+          <a:off x="0" y="0"/>
+          <a:ext cx="0" cy="0"/>
+          <a:chOff x="0" y="0"/>
+          <a:chExt cx="0" cy="0"/>
+        </a:xfrm>
+      </p:grpSpPr>
+      <p:sp>
+        <p:nvSpPr>
+          <p:cNvPr id="2" name="Title 1">
+            <a:extLst>
+              <a:ext uri="{FF2B5EF4-FFF2-40B4-BE49-F238E27FC236}">
                 <a16:creationId xmlns:a16="http://schemas.microsoft.com/office/drawing/2014/main" id="{553525AF-8AE4-D2F5-9261-98B5D6BE5227}"/>
               </a:ext>
             </a:extLst>
@@ -3958,6 +4769,719 @@
     <p:extLst>
       <p:ext uri="{BB962C8B-B14F-4D97-AF65-F5344CB8AC3E}">
         <p14:creationId xmlns:p14="http://schemas.microsoft.com/office/powerpoint/2010/main" val="3266116911"/>
+      </p:ext>
+    </p:extLst>
+  </p:cSld>
+  <p:clrMapOvr>
+    <a:masterClrMapping/>
+  </p:clrMapOvr>
+</p:sld>
+</file>
+
+<file path=ppt/slides/slide7.xml><?xml version="1.0" encoding="utf-8"?>
+<p:sld xmlns:a="http://schemas.openxmlformats.org/drawingml/2006/main" xmlns:r="http://schemas.openxmlformats.org/officeDocument/2006/relationships" xmlns:p="http://schemas.openxmlformats.org/presentationml/2006/main">
+  <p:cSld>
+    <p:spTree>
+      <p:nvGrpSpPr>
+        <p:cNvPr id="1" name=""/>
+        <p:cNvGrpSpPr/>
+        <p:nvPr/>
+      </p:nvGrpSpPr>
+      <p:grpSpPr>
+        <a:xfrm>
+          <a:off x="0" y="0"/>
+          <a:ext cx="0" cy="0"/>
+          <a:chOff x="0" y="0"/>
+          <a:chExt cx="0" cy="0"/>
+        </a:xfrm>
+      </p:grpSpPr>
+      <p:grpSp>
+        <p:nvGrpSpPr>
+          <p:cNvPr id="7" name="Group 6">
+            <a:extLst>
+              <a:ext uri="{FF2B5EF4-FFF2-40B4-BE49-F238E27FC236}">
+                <a16:creationId xmlns:a16="http://schemas.microsoft.com/office/drawing/2014/main" id="{34DCD1D0-AF1F-0714-4D3A-239D93279F1A}"/>
+              </a:ext>
+            </a:extLst>
+          </p:cNvPr>
+          <p:cNvGrpSpPr/>
+          <p:nvPr/>
+        </p:nvGrpSpPr>
+        <p:grpSpPr>
+          <a:xfrm>
+            <a:off x="7169751" y="2116138"/>
+            <a:ext cx="5107974" cy="5107974"/>
+            <a:chOff x="7169751" y="2116138"/>
+            <a:chExt cx="5107974" cy="5107974"/>
+          </a:xfrm>
+        </p:grpSpPr>
+        <p:pic>
+          <p:nvPicPr>
+            <p:cNvPr id="1028" name="Picture 4" descr="Ilustración de Ilustración Vectorial De Escala De Justicia y más Vectores  Libres de Derechos de Báscula - Báscula, Dibujar, Libra">
+              <a:extLst>
+                <a:ext uri="{FF2B5EF4-FFF2-40B4-BE49-F238E27FC236}">
+                  <a16:creationId xmlns:a16="http://schemas.microsoft.com/office/drawing/2014/main" id="{85BA1501-C752-9321-630D-5C8D383A75E8}"/>
+                </a:ext>
+              </a:extLst>
+            </p:cNvPr>
+            <p:cNvPicPr>
+              <a:picLocks noChangeAspect="1" noChangeArrowheads="1"/>
+            </p:cNvPicPr>
+            <p:nvPr/>
+          </p:nvPicPr>
+          <p:blipFill>
+            <a:blip r:embed="rId2">
+              <a:extLst>
+                <a:ext uri="{28A0092B-C50C-407E-A947-70E740481C1C}">
+                  <a14:useLocalDpi xmlns:a14="http://schemas.microsoft.com/office/drawing/2010/main" val="0"/>
+                </a:ext>
+              </a:extLst>
+            </a:blip>
+            <a:srcRect/>
+            <a:stretch>
+              <a:fillRect/>
+            </a:stretch>
+          </p:blipFill>
+          <p:spPr bwMode="auto">
+            <a:xfrm>
+              <a:off x="7169751" y="2116138"/>
+              <a:ext cx="5107974" cy="5107974"/>
+            </a:xfrm>
+            <a:prstGeom prst="rect">
+              <a:avLst/>
+            </a:prstGeom>
+            <a:noFill/>
+            <a:extLst>
+              <a:ext uri="{909E8E84-426E-40DD-AFC4-6F175D3DCCD1}">
+                <a14:hiddenFill xmlns:a14="http://schemas.microsoft.com/office/drawing/2010/main">
+                  <a:solidFill>
+                    <a:srgbClr val="FFFFFF"/>
+                  </a:solidFill>
+                </a14:hiddenFill>
+              </a:ext>
+            </a:extLst>
+          </p:spPr>
+        </p:pic>
+        <p:sp>
+          <p:nvSpPr>
+            <p:cNvPr id="5" name="TextBox 4">
+              <a:extLst>
+                <a:ext uri="{FF2B5EF4-FFF2-40B4-BE49-F238E27FC236}">
+                  <a16:creationId xmlns:a16="http://schemas.microsoft.com/office/drawing/2014/main" id="{B1B0F788-B122-149F-B4E7-90C26A0F60BD}"/>
+                </a:ext>
+              </a:extLst>
+            </p:cNvPr>
+            <p:cNvSpPr txBox="1"/>
+            <p:nvPr/>
+          </p:nvSpPr>
+          <p:spPr>
+            <a:xfrm>
+              <a:off x="8039100" y="4429125"/>
+              <a:ext cx="1181100" cy="646331"/>
+            </a:xfrm>
+            <a:prstGeom prst="rect">
+              <a:avLst/>
+            </a:prstGeom>
+            <a:noFill/>
+          </p:spPr>
+          <p:txBody>
+            <a:bodyPr wrap="square" rtlCol="0">
+              <a:spAutoFit/>
+            </a:bodyPr>
+            <a:lstStyle/>
+            <a:p>
+              <a:r>
+                <a:rPr lang="es-ES" dirty="0"/>
+                <a:t>Long </a:t>
+              </a:r>
+              <a:r>
+                <a:rPr lang="es-ES" dirty="0" err="1"/>
+                <a:t>reads</a:t>
+              </a:r>
+              <a:endParaRPr lang="en-GB" dirty="0"/>
+            </a:p>
+          </p:txBody>
+        </p:sp>
+        <p:sp>
+          <p:nvSpPr>
+            <p:cNvPr id="6" name="TextBox 5">
+              <a:extLst>
+                <a:ext uri="{FF2B5EF4-FFF2-40B4-BE49-F238E27FC236}">
+                  <a16:creationId xmlns:a16="http://schemas.microsoft.com/office/drawing/2014/main" id="{C420CAE9-457E-9909-363A-BCAC279DD65E}"/>
+                </a:ext>
+              </a:extLst>
+            </p:cNvPr>
+            <p:cNvSpPr txBox="1"/>
+            <p:nvPr/>
+          </p:nvSpPr>
+          <p:spPr>
+            <a:xfrm>
+              <a:off x="10839450" y="4429124"/>
+              <a:ext cx="762000" cy="646331"/>
+            </a:xfrm>
+            <a:prstGeom prst="rect">
+              <a:avLst/>
+            </a:prstGeom>
+            <a:noFill/>
+          </p:spPr>
+          <p:txBody>
+            <a:bodyPr wrap="square" rtlCol="0">
+              <a:spAutoFit/>
+            </a:bodyPr>
+            <a:lstStyle/>
+            <a:p>
+              <a:r>
+                <a:rPr lang="es-ES" dirty="0"/>
+                <a:t>Short </a:t>
+              </a:r>
+              <a:r>
+                <a:rPr lang="es-ES" dirty="0" err="1"/>
+                <a:t>reads</a:t>
+              </a:r>
+              <a:endParaRPr lang="en-GB" dirty="0"/>
+            </a:p>
+          </p:txBody>
+        </p:sp>
+      </p:grpSp>
+      <p:sp>
+        <p:nvSpPr>
+          <p:cNvPr id="3" name="Content Placeholder 2">
+            <a:extLst>
+              <a:ext uri="{FF2B5EF4-FFF2-40B4-BE49-F238E27FC236}">
+                <a16:creationId xmlns:a16="http://schemas.microsoft.com/office/drawing/2014/main" id="{208DA99D-8B57-BA55-B160-882B15979E61}"/>
+              </a:ext>
+            </a:extLst>
+          </p:cNvPr>
+          <p:cNvSpPr>
+            <a:spLocks noGrp="1"/>
+          </p:cNvSpPr>
+          <p:nvPr>
+            <p:ph idx="1"/>
+          </p:nvPr>
+        </p:nvSpPr>
+        <p:spPr/>
+        <p:txBody>
+          <a:bodyPr/>
+          <a:lstStyle/>
+          <a:p>
+            <a:r>
+              <a:rPr lang="es-ES" dirty="0" err="1"/>
+              <a:t>Combining</a:t>
+            </a:r>
+            <a:r>
+              <a:rPr lang="es-ES" dirty="0"/>
+              <a:t> </a:t>
+            </a:r>
+            <a:r>
+              <a:rPr lang="es-ES" dirty="0" err="1"/>
+              <a:t>the</a:t>
+            </a:r>
+            <a:r>
+              <a:rPr lang="es-ES" dirty="0"/>
+              <a:t> </a:t>
+            </a:r>
+            <a:r>
+              <a:rPr lang="es-ES" dirty="0" err="1"/>
+              <a:t>power</a:t>
+            </a:r>
+            <a:r>
+              <a:rPr lang="es-ES" dirty="0"/>
+              <a:t> </a:t>
+            </a:r>
+            <a:r>
+              <a:rPr lang="es-ES" dirty="0" err="1"/>
+              <a:t>of</a:t>
+            </a:r>
+            <a:r>
+              <a:rPr lang="es-ES" dirty="0"/>
+              <a:t> </a:t>
+            </a:r>
+            <a:r>
+              <a:rPr lang="es-ES" dirty="0" err="1"/>
+              <a:t>both</a:t>
+            </a:r>
+            <a:r>
+              <a:rPr lang="es-ES" dirty="0"/>
+              <a:t> short and </a:t>
+            </a:r>
+            <a:r>
+              <a:rPr lang="es-ES" dirty="0" err="1"/>
+              <a:t>long</a:t>
+            </a:r>
+            <a:r>
+              <a:rPr lang="es-ES" dirty="0"/>
+              <a:t> </a:t>
+            </a:r>
+            <a:r>
+              <a:rPr lang="es-ES" dirty="0" err="1"/>
+              <a:t>reads</a:t>
+            </a:r>
+            <a:r>
+              <a:rPr lang="es-ES" dirty="0"/>
+              <a:t>.</a:t>
+            </a:r>
+          </a:p>
+          <a:p>
+            <a:r>
+              <a:rPr lang="es-ES" dirty="0" err="1"/>
+              <a:t>Two</a:t>
+            </a:r>
+            <a:r>
+              <a:rPr lang="es-ES" dirty="0"/>
+              <a:t> </a:t>
+            </a:r>
+            <a:r>
+              <a:rPr lang="es-ES" dirty="0" err="1"/>
+              <a:t>approaches</a:t>
+            </a:r>
+            <a:r>
+              <a:rPr lang="es-ES" dirty="0"/>
+              <a:t> </a:t>
+            </a:r>
+            <a:r>
+              <a:rPr lang="es-ES" dirty="0" err="1"/>
+              <a:t>based</a:t>
+            </a:r>
+            <a:r>
+              <a:rPr lang="es-ES" dirty="0"/>
+              <a:t> </a:t>
+            </a:r>
+            <a:r>
+              <a:rPr lang="es-ES" dirty="0" err="1"/>
+              <a:t>on</a:t>
+            </a:r>
+            <a:r>
+              <a:rPr lang="es-ES" dirty="0"/>
+              <a:t> </a:t>
+            </a:r>
+            <a:r>
+              <a:rPr lang="es-ES" dirty="0" err="1"/>
+              <a:t>the</a:t>
+            </a:r>
+            <a:r>
+              <a:rPr lang="es-ES" dirty="0"/>
+              <a:t> </a:t>
+            </a:r>
+            <a:r>
+              <a:rPr lang="es-ES" dirty="0" err="1"/>
+              <a:t>available</a:t>
+            </a:r>
+            <a:r>
+              <a:rPr lang="es-ES" dirty="0"/>
+              <a:t> data</a:t>
+            </a:r>
+            <a:br>
+              <a:rPr lang="es-ES" dirty="0"/>
+            </a:br>
+            <a:endParaRPr lang="es-ES" dirty="0"/>
+          </a:p>
+          <a:p>
+            <a:pPr marL="914400" lvl="1" indent="-457200">
+              <a:buFont typeface="+mj-lt"/>
+              <a:buAutoNum type="arabicPeriod"/>
+            </a:pPr>
+            <a:r>
+              <a:rPr lang="es-ES" dirty="0" err="1"/>
+              <a:t>Assembly</a:t>
+            </a:r>
+            <a:r>
+              <a:rPr lang="es-ES" dirty="0"/>
+              <a:t> </a:t>
+            </a:r>
+            <a:r>
+              <a:rPr lang="es-ES" dirty="0" err="1"/>
+              <a:t>based</a:t>
+            </a:r>
+            <a:endParaRPr lang="es-ES" dirty="0"/>
+          </a:p>
+          <a:p>
+            <a:pPr lvl="2"/>
+            <a:r>
+              <a:rPr lang="es-ES" dirty="0">
+                <a:sym typeface="Wingdings" panose="05000000000000000000" pitchFamily="2" charset="2"/>
+              </a:rPr>
+              <a:t>Short </a:t>
+            </a:r>
+            <a:r>
+              <a:rPr lang="es-ES" dirty="0" err="1">
+                <a:sym typeface="Wingdings" panose="05000000000000000000" pitchFamily="2" charset="2"/>
+              </a:rPr>
+              <a:t>reads</a:t>
+            </a:r>
+            <a:r>
+              <a:rPr lang="es-ES" dirty="0">
+                <a:sym typeface="Wingdings" panose="05000000000000000000" pitchFamily="2" charset="2"/>
+              </a:rPr>
+              <a:t> </a:t>
+            </a:r>
+            <a:r>
+              <a:rPr lang="es-ES" dirty="0" err="1">
+                <a:sym typeface="Wingdings" panose="05000000000000000000" pitchFamily="2" charset="2"/>
+              </a:rPr>
+              <a:t>assembly</a:t>
+            </a:r>
+            <a:r>
+              <a:rPr lang="es-ES" dirty="0">
+                <a:sym typeface="Wingdings" panose="05000000000000000000" pitchFamily="2" charset="2"/>
+              </a:rPr>
+              <a:t>  Long </a:t>
+            </a:r>
+            <a:r>
+              <a:rPr lang="es-ES" dirty="0" err="1">
+                <a:sym typeface="Wingdings" panose="05000000000000000000" pitchFamily="2" charset="2"/>
+              </a:rPr>
+              <a:t>reads</a:t>
+            </a:r>
+            <a:r>
+              <a:rPr lang="es-ES" dirty="0">
+                <a:sym typeface="Wingdings" panose="05000000000000000000" pitchFamily="2" charset="2"/>
+              </a:rPr>
+              <a:t> </a:t>
+            </a:r>
+            <a:r>
+              <a:rPr lang="es-ES" dirty="0" err="1">
+                <a:sym typeface="Wingdings" panose="05000000000000000000" pitchFamily="2" charset="2"/>
+              </a:rPr>
+              <a:t>resolve</a:t>
+            </a:r>
+            <a:endParaRPr lang="es-ES" dirty="0">
+              <a:sym typeface="Wingdings" panose="05000000000000000000" pitchFamily="2" charset="2"/>
+            </a:endParaRPr>
+          </a:p>
+          <a:p>
+            <a:pPr marL="914400" lvl="1" indent="-457200">
+              <a:buFont typeface="+mj-lt"/>
+              <a:buAutoNum type="arabicPeriod"/>
+            </a:pPr>
+            <a:r>
+              <a:rPr lang="es-ES" dirty="0" err="1">
+                <a:sym typeface="Wingdings" panose="05000000000000000000" pitchFamily="2" charset="2"/>
+              </a:rPr>
+              <a:t>Alignment</a:t>
+            </a:r>
+            <a:r>
+              <a:rPr lang="es-ES" dirty="0">
+                <a:sym typeface="Wingdings" panose="05000000000000000000" pitchFamily="2" charset="2"/>
+              </a:rPr>
+              <a:t> </a:t>
+            </a:r>
+            <a:r>
+              <a:rPr lang="es-ES" dirty="0" err="1">
+                <a:sym typeface="Wingdings" panose="05000000000000000000" pitchFamily="2" charset="2"/>
+              </a:rPr>
+              <a:t>based</a:t>
+            </a:r>
+            <a:endParaRPr lang="es-ES" dirty="0">
+              <a:sym typeface="Wingdings" panose="05000000000000000000" pitchFamily="2" charset="2"/>
+            </a:endParaRPr>
+          </a:p>
+          <a:p>
+            <a:pPr lvl="2"/>
+            <a:r>
+              <a:rPr lang="es-ES" dirty="0">
+                <a:sym typeface="Wingdings" panose="05000000000000000000" pitchFamily="2" charset="2"/>
+              </a:rPr>
+              <a:t>Long </a:t>
+            </a:r>
+            <a:r>
+              <a:rPr lang="es-ES" dirty="0" err="1">
+                <a:sym typeface="Wingdings" panose="05000000000000000000" pitchFamily="2" charset="2"/>
+              </a:rPr>
+              <a:t>reads</a:t>
+            </a:r>
+            <a:r>
+              <a:rPr lang="es-ES" dirty="0">
+                <a:sym typeface="Wingdings" panose="05000000000000000000" pitchFamily="2" charset="2"/>
+              </a:rPr>
+              <a:t> </a:t>
+            </a:r>
+            <a:r>
+              <a:rPr lang="es-ES" dirty="0" err="1">
+                <a:sym typeface="Wingdings" panose="05000000000000000000" pitchFamily="2" charset="2"/>
+              </a:rPr>
+              <a:t>assembly</a:t>
+            </a:r>
+            <a:r>
+              <a:rPr lang="es-ES" dirty="0">
+                <a:sym typeface="Wingdings" panose="05000000000000000000" pitchFamily="2" charset="2"/>
+              </a:rPr>
+              <a:t>  Short </a:t>
+            </a:r>
+            <a:r>
+              <a:rPr lang="es-ES" dirty="0" err="1">
+                <a:sym typeface="Wingdings" panose="05000000000000000000" pitchFamily="2" charset="2"/>
+              </a:rPr>
+              <a:t>reads</a:t>
+            </a:r>
+            <a:r>
+              <a:rPr lang="es-ES" dirty="0">
+                <a:sym typeface="Wingdings" panose="05000000000000000000" pitchFamily="2" charset="2"/>
+              </a:rPr>
+              <a:t> </a:t>
+            </a:r>
+            <a:r>
+              <a:rPr lang="es-ES" dirty="0" err="1">
+                <a:sym typeface="Wingdings" panose="05000000000000000000" pitchFamily="2" charset="2"/>
+              </a:rPr>
+              <a:t>polish</a:t>
+            </a:r>
+            <a:endParaRPr lang="es-ES" dirty="0"/>
+          </a:p>
+          <a:p>
+            <a:pPr lvl="1"/>
+            <a:endParaRPr lang="en-GB" dirty="0"/>
+          </a:p>
+        </p:txBody>
+      </p:sp>
+      <p:sp>
+        <p:nvSpPr>
+          <p:cNvPr id="4" name="Title 3">
+            <a:extLst>
+              <a:ext uri="{FF2B5EF4-FFF2-40B4-BE49-F238E27FC236}">
+                <a16:creationId xmlns:a16="http://schemas.microsoft.com/office/drawing/2014/main" id="{2A3F501C-8482-C7E6-E532-356F16FE1746}"/>
+              </a:ext>
+            </a:extLst>
+          </p:cNvPr>
+          <p:cNvSpPr>
+            <a:spLocks noGrp="1"/>
+          </p:cNvSpPr>
+          <p:nvPr>
+            <p:ph type="title"/>
+          </p:nvPr>
+        </p:nvSpPr>
+        <p:spPr/>
+        <p:txBody>
+          <a:bodyPr/>
+          <a:lstStyle/>
+          <a:p>
+            <a:r>
+              <a:rPr lang="es-ES" dirty="0" err="1"/>
+              <a:t>Hybrid</a:t>
+            </a:r>
+            <a:r>
+              <a:rPr lang="es-ES" dirty="0"/>
+              <a:t> </a:t>
+            </a:r>
+            <a:r>
+              <a:rPr lang="es-ES" dirty="0" err="1"/>
+              <a:t>assembly</a:t>
+            </a:r>
+            <a:endParaRPr lang="en-GB" dirty="0"/>
+          </a:p>
+        </p:txBody>
+      </p:sp>
+    </p:spTree>
+    <p:extLst>
+      <p:ext uri="{BB962C8B-B14F-4D97-AF65-F5344CB8AC3E}">
+        <p14:creationId xmlns:p14="http://schemas.microsoft.com/office/powerpoint/2010/main" val="3855257112"/>
+      </p:ext>
+    </p:extLst>
+  </p:cSld>
+  <p:clrMapOvr>
+    <a:masterClrMapping/>
+  </p:clrMapOvr>
+</p:sld>
+</file>
+
+<file path=ppt/slides/slide8.xml><?xml version="1.0" encoding="utf-8"?>
+<p:sld xmlns:a="http://schemas.openxmlformats.org/drawingml/2006/main" xmlns:r="http://schemas.openxmlformats.org/officeDocument/2006/relationships" xmlns:p="http://schemas.openxmlformats.org/presentationml/2006/main">
+  <p:cSld>
+    <p:spTree>
+      <p:nvGrpSpPr>
+        <p:cNvPr id="1" name=""/>
+        <p:cNvGrpSpPr/>
+        <p:nvPr/>
+      </p:nvGrpSpPr>
+      <p:grpSpPr>
+        <a:xfrm>
+          <a:off x="0" y="0"/>
+          <a:ext cx="0" cy="0"/>
+          <a:chOff x="0" y="0"/>
+          <a:chExt cx="0" cy="0"/>
+        </a:xfrm>
+      </p:grpSpPr>
+      <p:sp>
+        <p:nvSpPr>
+          <p:cNvPr id="7" name="Title 1">
+            <a:extLst>
+              <a:ext uri="{FF2B5EF4-FFF2-40B4-BE49-F238E27FC236}">
+                <a16:creationId xmlns:a16="http://schemas.microsoft.com/office/drawing/2014/main" id="{C4025501-70D9-C78C-C3D9-92DE03275D0B}"/>
+              </a:ext>
+            </a:extLst>
+          </p:cNvPr>
+          <p:cNvSpPr txBox="1">
+            <a:spLocks/>
+          </p:cNvSpPr>
+          <p:nvPr/>
+        </p:nvSpPr>
+        <p:spPr>
+          <a:xfrm>
+            <a:off x="838200" y="365125"/>
+            <a:ext cx="10515600" cy="1325563"/>
+          </a:xfrm>
+          <a:prstGeom prst="rect">
+            <a:avLst/>
+          </a:prstGeom>
+        </p:spPr>
+        <p:txBody>
+          <a:bodyPr vert="horz" lIns="91440" tIns="45720" rIns="91440" bIns="45720" rtlCol="0" anchor="ctr">
+            <a:normAutofit/>
+          </a:bodyPr>
+          <a:lstStyle>
+            <a:lvl1pPr algn="l" defTabSz="914400" rtl="0" eaLnBrk="1" latinLnBrk="0" hangingPunct="1">
+              <a:lnSpc>
+                <a:spcPct val="90000"/>
+              </a:lnSpc>
+              <a:spcBef>
+                <a:spcPct val="0"/>
+              </a:spcBef>
+              <a:buNone/>
+              <a:defRPr sz="4400" kern="1200">
+                <a:solidFill>
+                  <a:schemeClr val="tx1"/>
+                </a:solidFill>
+                <a:latin typeface="+mj-lt"/>
+                <a:ea typeface="+mj-ea"/>
+                <a:cs typeface="+mj-cs"/>
+              </a:defRPr>
+            </a:lvl1pPr>
+          </a:lstStyle>
+          <a:p>
+            <a:endParaRPr lang="en-GB" dirty="0"/>
+          </a:p>
+        </p:txBody>
+      </p:sp>
+      <p:pic>
+        <p:nvPicPr>
+          <p:cNvPr id="8" name="Picture 2">
+            <a:extLst>
+              <a:ext uri="{FF2B5EF4-FFF2-40B4-BE49-F238E27FC236}">
+                <a16:creationId xmlns:a16="http://schemas.microsoft.com/office/drawing/2014/main" id="{9BB75A44-7F3F-5698-6267-04FFC3514DFC}"/>
+              </a:ext>
+            </a:extLst>
+          </p:cNvPr>
+          <p:cNvPicPr>
+            <a:picLocks noChangeAspect="1" noChangeArrowheads="1"/>
+          </p:cNvPicPr>
+          <p:nvPr/>
+        </p:nvPicPr>
+        <p:blipFill>
+          <a:blip r:embed="rId2">
+            <a:extLst>
+              <a:ext uri="{28A0092B-C50C-407E-A947-70E740481C1C}">
+                <a14:useLocalDpi xmlns:a14="http://schemas.microsoft.com/office/drawing/2010/main" val="0"/>
+              </a:ext>
+            </a:extLst>
+          </a:blip>
+          <a:srcRect/>
+          <a:stretch>
+            <a:fillRect/>
+          </a:stretch>
+        </p:blipFill>
+        <p:spPr bwMode="auto">
+          <a:xfrm>
+            <a:off x="2047875" y="242888"/>
+            <a:ext cx="8096250" cy="6372225"/>
+          </a:xfrm>
+          <a:prstGeom prst="rect">
+            <a:avLst/>
+          </a:prstGeom>
+          <a:noFill/>
+          <a:extLst>
+            <a:ext uri="{909E8E84-426E-40DD-AFC4-6F175D3DCCD1}">
+              <a14:hiddenFill xmlns:a14="http://schemas.microsoft.com/office/drawing/2010/main">
+                <a:solidFill>
+                  <a:srgbClr val="FFFFFF"/>
+                </a:solidFill>
+              </a14:hiddenFill>
+            </a:ext>
+          </a:extLst>
+        </p:spPr>
+      </p:pic>
+    </p:spTree>
+    <p:extLst>
+      <p:ext uri="{BB962C8B-B14F-4D97-AF65-F5344CB8AC3E}">
+        <p14:creationId xmlns:p14="http://schemas.microsoft.com/office/powerpoint/2010/main" val="3351586866"/>
+      </p:ext>
+    </p:extLst>
+  </p:cSld>
+  <p:clrMapOvr>
+    <a:masterClrMapping/>
+  </p:clrMapOvr>
+</p:sld>
+</file>
+
+<file path=ppt/slides/slide9.xml><?xml version="1.0" encoding="utf-8"?>
+<p:sld xmlns:a="http://schemas.openxmlformats.org/drawingml/2006/main" xmlns:r="http://schemas.openxmlformats.org/officeDocument/2006/relationships" xmlns:p="http://schemas.openxmlformats.org/presentationml/2006/main">
+  <p:cSld>
+    <p:spTree>
+      <p:nvGrpSpPr>
+        <p:cNvPr id="1" name=""/>
+        <p:cNvGrpSpPr/>
+        <p:nvPr/>
+      </p:nvGrpSpPr>
+      <p:grpSpPr>
+        <a:xfrm>
+          <a:off x="0" y="0"/>
+          <a:ext cx="0" cy="0"/>
+          <a:chOff x="0" y="0"/>
+          <a:chExt cx="0" cy="0"/>
+        </a:xfrm>
+      </p:grpSpPr>
+      <p:sp>
+        <p:nvSpPr>
+          <p:cNvPr id="2" name="Title 1">
+            <a:extLst>
+              <a:ext uri="{FF2B5EF4-FFF2-40B4-BE49-F238E27FC236}">
+                <a16:creationId xmlns:a16="http://schemas.microsoft.com/office/drawing/2014/main" id="{9B8CC28D-D59F-1B9F-6CDE-2DB7ECD2E82C}"/>
+              </a:ext>
+            </a:extLst>
+          </p:cNvPr>
+          <p:cNvSpPr>
+            <a:spLocks noGrp="1"/>
+          </p:cNvSpPr>
+          <p:nvPr>
+            <p:ph type="title"/>
+          </p:nvPr>
+        </p:nvSpPr>
+        <p:spPr/>
+        <p:txBody>
+          <a:bodyPr/>
+          <a:lstStyle/>
+          <a:p>
+            <a:endParaRPr lang="en-GB"/>
+          </a:p>
+        </p:txBody>
+      </p:sp>
+      <p:sp>
+        <p:nvSpPr>
+          <p:cNvPr id="3" name="Content Placeholder 2">
+            <a:extLst>
+              <a:ext uri="{FF2B5EF4-FFF2-40B4-BE49-F238E27FC236}">
+                <a16:creationId xmlns:a16="http://schemas.microsoft.com/office/drawing/2014/main" id="{E329ED86-F3FF-5665-3713-313E174FB061}"/>
+              </a:ext>
+            </a:extLst>
+          </p:cNvPr>
+          <p:cNvSpPr>
+            <a:spLocks noGrp="1"/>
+          </p:cNvSpPr>
+          <p:nvPr>
+            <p:ph idx="1"/>
+          </p:nvPr>
+        </p:nvSpPr>
+        <p:spPr/>
+        <p:txBody>
+          <a:bodyPr/>
+          <a:lstStyle/>
+          <a:p>
+            <a:endParaRPr lang="en-GB"/>
+          </a:p>
+        </p:txBody>
+      </p:sp>
+    </p:spTree>
+    <p:extLst>
+      <p:ext uri="{BB962C8B-B14F-4D97-AF65-F5344CB8AC3E}">
+        <p14:creationId xmlns:p14="http://schemas.microsoft.com/office/powerpoint/2010/main" val="1608918025"/>
       </p:ext>
     </p:extLst>
   </p:cSld>

</xml_diff>